<commit_message>
l4: r: small modification to the hubble tuning fork diagram
</commit_message>
<xml_diff>
--- a/project/report/introduction/diagrams.pptx
+++ b/project/report/introduction/diagrams.pptx
@@ -104,6 +104,11 @@
       </a:defRPr>
     </a:lvl9pPr>
   </p:defaultTextStyle>
+  <p:extLst>
+    <p:ext uri="{EFAFB233-063F-42B5-8137-9DF3F51BA10A}">
+      <p15:sldGuideLst xmlns:p15="http://schemas.microsoft.com/office/powerpoint/2012/main"/>
+    </p:ext>
+  </p:extLst>
 </p:presentation>
 </file>
 
@@ -5819,9 +5824,9 @@
           <p:nvPr/>
         </p:nvGrpSpPr>
         <p:grpSpPr>
-          <a:xfrm>
-            <a:off x="7901251" y="4646802"/>
-            <a:ext cx="583412" cy="1087438"/>
+          <a:xfrm flipH="1">
+            <a:off x="7901251" y="4584000"/>
+            <a:ext cx="682585" cy="1087438"/>
             <a:chOff x="9299437" y="4537710"/>
             <a:chExt cx="583412" cy="1087438"/>
           </a:xfrm>

</xml_diff>